<commit_message>
Modified Astro Presentation and Sucesffuly Plugged in Error into my Plot
</commit_message>
<xml_diff>
--- a/Mykola C - Astrophysics Concepts Presentation.pptx
+++ b/Mykola C - Astrophysics Concepts Presentation.pptx
@@ -221,7 +221,7 @@
           <a:p>
             <a:fld id="{85B7F405-C1FA-7E4B-83A0-4BB93B15E44A}" type="datetimeFigureOut">
               <a:rPr lang="en-US" smtClean="0"/>
-              <a:t>11/13/24</a:t>
+              <a:t>12/4/24</a:t>
             </a:fld>
             <a:endParaRPr lang="en-US"/>
           </a:p>
@@ -835,7 +835,7 @@
           <a:p>
             <a:fld id="{5BCAD085-E8A6-8845-BD4E-CB4CCA059FC4}" type="datetimeFigureOut">
               <a:rPr lang="en-US" smtClean="0"/>
-              <a:t>11/13/24</a:t>
+              <a:t>12/4/24</a:t>
             </a:fld>
             <a:endParaRPr lang="en-US"/>
           </a:p>
@@ -1003,7 +1003,7 @@
           <a:p>
             <a:fld id="{5BCAD085-E8A6-8845-BD4E-CB4CCA059FC4}" type="datetimeFigureOut">
               <a:rPr lang="en-US" smtClean="0"/>
-              <a:t>11/13/24</a:t>
+              <a:t>12/4/24</a:t>
             </a:fld>
             <a:endParaRPr lang="en-US"/>
           </a:p>
@@ -1181,7 +1181,7 @@
           <a:p>
             <a:fld id="{5BCAD085-E8A6-8845-BD4E-CB4CCA059FC4}" type="datetimeFigureOut">
               <a:rPr lang="en-US" smtClean="0"/>
-              <a:t>11/13/24</a:t>
+              <a:t>12/4/24</a:t>
             </a:fld>
             <a:endParaRPr lang="en-US"/>
           </a:p>
@@ -1349,7 +1349,7 @@
           <a:p>
             <a:fld id="{5BCAD085-E8A6-8845-BD4E-CB4CCA059FC4}" type="datetimeFigureOut">
               <a:rPr lang="en-US" smtClean="0"/>
-              <a:t>11/13/24</a:t>
+              <a:t>12/4/24</a:t>
             </a:fld>
             <a:endParaRPr lang="en-US"/>
           </a:p>
@@ -1594,7 +1594,7 @@
           <a:p>
             <a:fld id="{5BCAD085-E8A6-8845-BD4E-CB4CCA059FC4}" type="datetimeFigureOut">
               <a:rPr lang="en-US" smtClean="0"/>
-              <a:t>11/13/24</a:t>
+              <a:t>12/4/24</a:t>
             </a:fld>
             <a:endParaRPr lang="en-US"/>
           </a:p>
@@ -1879,7 +1879,7 @@
           <a:p>
             <a:fld id="{5BCAD085-E8A6-8845-BD4E-CB4CCA059FC4}" type="datetimeFigureOut">
               <a:rPr lang="en-US" smtClean="0"/>
-              <a:t>11/13/24</a:t>
+              <a:t>12/4/24</a:t>
             </a:fld>
             <a:endParaRPr lang="en-US"/>
           </a:p>
@@ -2298,7 +2298,7 @@
           <a:p>
             <a:fld id="{5BCAD085-E8A6-8845-BD4E-CB4CCA059FC4}" type="datetimeFigureOut">
               <a:rPr lang="en-US" smtClean="0"/>
-              <a:t>11/13/24</a:t>
+              <a:t>12/4/24</a:t>
             </a:fld>
             <a:endParaRPr lang="en-US"/>
           </a:p>
@@ -2415,7 +2415,7 @@
           <a:p>
             <a:fld id="{5BCAD085-E8A6-8845-BD4E-CB4CCA059FC4}" type="datetimeFigureOut">
               <a:rPr lang="en-US" smtClean="0"/>
-              <a:t>11/13/24</a:t>
+              <a:t>12/4/24</a:t>
             </a:fld>
             <a:endParaRPr lang="en-US"/>
           </a:p>
@@ -2510,7 +2510,7 @@
           <a:p>
             <a:fld id="{5BCAD085-E8A6-8845-BD4E-CB4CCA059FC4}" type="datetimeFigureOut">
               <a:rPr lang="en-US" smtClean="0"/>
-              <a:t>11/13/24</a:t>
+              <a:t>12/4/24</a:t>
             </a:fld>
             <a:endParaRPr lang="en-US"/>
           </a:p>
@@ -2785,7 +2785,7 @@
           <a:p>
             <a:fld id="{5BCAD085-E8A6-8845-BD4E-CB4CCA059FC4}" type="datetimeFigureOut">
               <a:rPr lang="en-US" smtClean="0"/>
-              <a:t>11/13/24</a:t>
+              <a:t>12/4/24</a:t>
             </a:fld>
             <a:endParaRPr lang="en-US"/>
           </a:p>
@@ -3037,7 +3037,7 @@
           <a:p>
             <a:fld id="{5BCAD085-E8A6-8845-BD4E-CB4CCA059FC4}" type="datetimeFigureOut">
               <a:rPr lang="en-US" smtClean="0"/>
-              <a:t>11/13/24</a:t>
+              <a:t>12/4/24</a:t>
             </a:fld>
             <a:endParaRPr lang="en-US"/>
           </a:p>
@@ -3248,7 +3248,7 @@
           <a:p>
             <a:fld id="{5BCAD085-E8A6-8845-BD4E-CB4CCA059FC4}" type="datetimeFigureOut">
               <a:rPr lang="en-US" smtClean="0"/>
-              <a:t>11/13/24</a:t>
+              <a:t>12/4/24</a:t>
             </a:fld>
             <a:endParaRPr lang="en-US"/>
           </a:p>

</xml_diff>